<commit_message>
a bunch of updates for documentation
</commit_message>
<xml_diff>
--- a/drawings.pptx
+++ b/drawings.pptx
@@ -5,7 +5,8 @@
     <p:sldMasterId id="2147483648" r:id="rId1"/>
   </p:sldMasterIdLst>
   <p:sldIdLst>
-    <p:sldId id="256" r:id="rId2"/>
+    <p:sldId id="258" r:id="rId2"/>
+    <p:sldId id="256" r:id="rId3"/>
   </p:sldIdLst>
   <p:sldSz cx="12192000" cy="6858000"/>
   <p:notesSz cx="6858000" cy="9144000"/>
@@ -259,7 +260,7 @@
           <a:p>
             <a:fld id="{2F40B82E-C92E-2C4F-9BCE-89BAC76BCCCC}" type="datetimeFigureOut">
               <a:rPr lang="en-US" smtClean="0"/>
-              <a:t>5/15/22</a:t>
+              <a:t>5/18/22</a:t>
             </a:fld>
             <a:endParaRPr lang="en-US"/>
           </a:p>
@@ -457,7 +458,7 @@
           <a:p>
             <a:fld id="{2F40B82E-C92E-2C4F-9BCE-89BAC76BCCCC}" type="datetimeFigureOut">
               <a:rPr lang="en-US" smtClean="0"/>
-              <a:t>5/15/22</a:t>
+              <a:t>5/18/22</a:t>
             </a:fld>
             <a:endParaRPr lang="en-US"/>
           </a:p>
@@ -665,7 +666,7 @@
           <a:p>
             <a:fld id="{2F40B82E-C92E-2C4F-9BCE-89BAC76BCCCC}" type="datetimeFigureOut">
               <a:rPr lang="en-US" smtClean="0"/>
-              <a:t>5/15/22</a:t>
+              <a:t>5/18/22</a:t>
             </a:fld>
             <a:endParaRPr lang="en-US"/>
           </a:p>
@@ -863,7 +864,7 @@
           <a:p>
             <a:fld id="{2F40B82E-C92E-2C4F-9BCE-89BAC76BCCCC}" type="datetimeFigureOut">
               <a:rPr lang="en-US" smtClean="0"/>
-              <a:t>5/15/22</a:t>
+              <a:t>5/18/22</a:t>
             </a:fld>
             <a:endParaRPr lang="en-US"/>
           </a:p>
@@ -1138,7 +1139,7 @@
           <a:p>
             <a:fld id="{2F40B82E-C92E-2C4F-9BCE-89BAC76BCCCC}" type="datetimeFigureOut">
               <a:rPr lang="en-US" smtClean="0"/>
-              <a:t>5/15/22</a:t>
+              <a:t>5/18/22</a:t>
             </a:fld>
             <a:endParaRPr lang="en-US"/>
           </a:p>
@@ -1403,7 +1404,7 @@
           <a:p>
             <a:fld id="{2F40B82E-C92E-2C4F-9BCE-89BAC76BCCCC}" type="datetimeFigureOut">
               <a:rPr lang="en-US" smtClean="0"/>
-              <a:t>5/15/22</a:t>
+              <a:t>5/18/22</a:t>
             </a:fld>
             <a:endParaRPr lang="en-US"/>
           </a:p>
@@ -1815,7 +1816,7 @@
           <a:p>
             <a:fld id="{2F40B82E-C92E-2C4F-9BCE-89BAC76BCCCC}" type="datetimeFigureOut">
               <a:rPr lang="en-US" smtClean="0"/>
-              <a:t>5/15/22</a:t>
+              <a:t>5/18/22</a:t>
             </a:fld>
             <a:endParaRPr lang="en-US"/>
           </a:p>
@@ -1956,7 +1957,7 @@
           <a:p>
             <a:fld id="{2F40B82E-C92E-2C4F-9BCE-89BAC76BCCCC}" type="datetimeFigureOut">
               <a:rPr lang="en-US" smtClean="0"/>
-              <a:t>5/15/22</a:t>
+              <a:t>5/18/22</a:t>
             </a:fld>
             <a:endParaRPr lang="en-US"/>
           </a:p>
@@ -2069,7 +2070,7 @@
           <a:p>
             <a:fld id="{2F40B82E-C92E-2C4F-9BCE-89BAC76BCCCC}" type="datetimeFigureOut">
               <a:rPr lang="en-US" smtClean="0"/>
-              <a:t>5/15/22</a:t>
+              <a:t>5/18/22</a:t>
             </a:fld>
             <a:endParaRPr lang="en-US"/>
           </a:p>
@@ -2380,7 +2381,7 @@
           <a:p>
             <a:fld id="{2F40B82E-C92E-2C4F-9BCE-89BAC76BCCCC}" type="datetimeFigureOut">
               <a:rPr lang="en-US" smtClean="0"/>
-              <a:t>5/15/22</a:t>
+              <a:t>5/18/22</a:t>
             </a:fld>
             <a:endParaRPr lang="en-US"/>
           </a:p>
@@ -2668,7 +2669,7 @@
           <a:p>
             <a:fld id="{2F40B82E-C92E-2C4F-9BCE-89BAC76BCCCC}" type="datetimeFigureOut">
               <a:rPr lang="en-US" smtClean="0"/>
-              <a:t>5/15/22</a:t>
+              <a:t>5/18/22</a:t>
             </a:fld>
             <a:endParaRPr lang="en-US"/>
           </a:p>
@@ -2909,7 +2910,7 @@
           <a:p>
             <a:fld id="{2F40B82E-C92E-2C4F-9BCE-89BAC76BCCCC}" type="datetimeFigureOut">
               <a:rPr lang="en-US" smtClean="0"/>
-              <a:t>5/15/22</a:t>
+              <a:t>5/18/22</a:t>
             </a:fld>
             <a:endParaRPr lang="en-US"/>
           </a:p>
@@ -3328,10 +3329,10 @@
       </p:grpSpPr>
       <p:grpSp>
         <p:nvGrpSpPr>
-          <p:cNvPr id="46" name="Group 45">
-            <a:extLst>
-              <a:ext uri="{FF2B5EF4-FFF2-40B4-BE49-F238E27FC236}">
-                <a16:creationId xmlns:a16="http://schemas.microsoft.com/office/drawing/2014/main" id="{63C85AD8-8720-3946-86AD-B6C66C819AB6}"/>
+          <p:cNvPr id="88" name="Group 87">
+            <a:extLst>
+              <a:ext uri="{FF2B5EF4-FFF2-40B4-BE49-F238E27FC236}">
+                <a16:creationId xmlns:a16="http://schemas.microsoft.com/office/drawing/2014/main" id="{5BE629CA-2B06-1B49-B753-766345D18604}"/>
               </a:ext>
             </a:extLst>
           </p:cNvPr>
@@ -3340,12 +3341,723 @@
         </p:nvGrpSpPr>
         <p:grpSpPr>
           <a:xfrm>
-            <a:off x="1069966" y="1595672"/>
-            <a:ext cx="8123461" cy="4569849"/>
-            <a:chOff x="1069966" y="1595672"/>
-            <a:chExt cx="8123461" cy="4569849"/>
+            <a:off x="3042745" y="167168"/>
+            <a:ext cx="5162139" cy="6252634"/>
+            <a:chOff x="3042745" y="167168"/>
+            <a:chExt cx="5162139" cy="6252634"/>
           </a:xfrm>
         </p:grpSpPr>
+        <p:sp>
+          <p:nvSpPr>
+            <p:cNvPr id="35" name="TextBox 34">
+              <a:extLst>
+                <a:ext uri="{FF2B5EF4-FFF2-40B4-BE49-F238E27FC236}">
+                  <a16:creationId xmlns:a16="http://schemas.microsoft.com/office/drawing/2014/main" id="{35BEE465-9296-1249-826D-62C1F23BACBE}"/>
+                </a:ext>
+              </a:extLst>
+            </p:cNvPr>
+            <p:cNvSpPr txBox="1"/>
+            <p:nvPr/>
+          </p:nvSpPr>
+          <p:spPr>
+            <a:xfrm>
+              <a:off x="5004189" y="167168"/>
+              <a:ext cx="914400" cy="685800"/>
+            </a:xfrm>
+            <a:prstGeom prst="rect">
+              <a:avLst/>
+            </a:prstGeom>
+            <a:noFill/>
+            <a:ln>
+              <a:solidFill>
+                <a:schemeClr val="tx1"/>
+              </a:solidFill>
+            </a:ln>
+          </p:spPr>
+          <p:txBody>
+            <a:bodyPr wrap="none" lIns="0" tIns="0" rIns="0" bIns="0" rtlCol="0" anchor="ctr" anchorCtr="1">
+              <a:noAutofit/>
+            </a:bodyPr>
+            <a:lstStyle/>
+            <a:p>
+              <a:pPr algn="ctr"/>
+              <a:r>
+                <a:rPr lang="en-US" dirty="0"/>
+                <a:t>Web</a:t>
+              </a:r>
+            </a:p>
+            <a:p>
+              <a:pPr algn="ctr"/>
+              <a:r>
+                <a:rPr lang="en-US" dirty="0"/>
+                <a:t>Browser</a:t>
+              </a:r>
+            </a:p>
+          </p:txBody>
+        </p:sp>
+        <p:cxnSp>
+          <p:nvCxnSpPr>
+            <p:cNvPr id="38" name="Straight Arrow Connector 37">
+              <a:extLst>
+                <a:ext uri="{FF2B5EF4-FFF2-40B4-BE49-F238E27FC236}">
+                  <a16:creationId xmlns:a16="http://schemas.microsoft.com/office/drawing/2014/main" id="{474DA1B1-D789-1A4B-B1B9-385DDA00AB04}"/>
+                </a:ext>
+              </a:extLst>
+            </p:cNvPr>
+            <p:cNvCxnSpPr>
+              <a:cxnSpLocks/>
+              <a:endCxn id="49" idx="1"/>
+            </p:cNvCxnSpPr>
+            <p:nvPr/>
+          </p:nvCxnSpPr>
+          <p:spPr>
+            <a:xfrm flipV="1">
+              <a:off x="4342676" y="2880157"/>
+              <a:ext cx="661513" cy="2815252"/>
+            </a:xfrm>
+            <a:prstGeom prst="straightConnector1">
+              <a:avLst/>
+            </a:prstGeom>
+            <a:ln w="12700">
+              <a:headEnd type="triangle"/>
+              <a:tailEnd type="triangle"/>
+            </a:ln>
+          </p:spPr>
+          <p:style>
+            <a:lnRef idx="1">
+              <a:schemeClr val="accent1"/>
+            </a:lnRef>
+            <a:fillRef idx="0">
+              <a:schemeClr val="accent1"/>
+            </a:fillRef>
+            <a:effectRef idx="0">
+              <a:schemeClr val="accent1"/>
+            </a:effectRef>
+            <a:fontRef idx="minor">
+              <a:schemeClr val="tx1"/>
+            </a:fontRef>
+          </p:style>
+        </p:cxnSp>
+        <p:sp>
+          <p:nvSpPr>
+            <p:cNvPr id="42" name="TextBox 41">
+              <a:extLst>
+                <a:ext uri="{FF2B5EF4-FFF2-40B4-BE49-F238E27FC236}">
+                  <a16:creationId xmlns:a16="http://schemas.microsoft.com/office/drawing/2014/main" id="{85906003-9F36-4540-98BB-6E039E1D05E6}"/>
+                </a:ext>
+              </a:extLst>
+            </p:cNvPr>
+            <p:cNvSpPr txBox="1"/>
+            <p:nvPr/>
+          </p:nvSpPr>
+          <p:spPr>
+            <a:xfrm>
+              <a:off x="5004189" y="1160396"/>
+              <a:ext cx="914400" cy="685800"/>
+            </a:xfrm>
+            <a:prstGeom prst="rect">
+              <a:avLst/>
+            </a:prstGeom>
+            <a:noFill/>
+            <a:ln>
+              <a:solidFill>
+                <a:schemeClr val="tx1"/>
+              </a:solidFill>
+            </a:ln>
+          </p:spPr>
+          <p:txBody>
+            <a:bodyPr wrap="none" lIns="0" tIns="0" rIns="0" bIns="0" rtlCol="0" anchor="ctr" anchorCtr="1">
+              <a:noAutofit/>
+            </a:bodyPr>
+            <a:lstStyle/>
+            <a:p>
+              <a:pPr algn="ctr"/>
+              <a:r>
+                <a:rPr lang="en-US" dirty="0" err="1"/>
+                <a:t>nginx</a:t>
+              </a:r>
+              <a:endParaRPr lang="en-US" dirty="0"/>
+            </a:p>
+          </p:txBody>
+        </p:sp>
+        <p:sp>
+          <p:nvSpPr>
+            <p:cNvPr id="46" name="TextBox 45">
+              <a:extLst>
+                <a:ext uri="{FF2B5EF4-FFF2-40B4-BE49-F238E27FC236}">
+                  <a16:creationId xmlns:a16="http://schemas.microsoft.com/office/drawing/2014/main" id="{EECD65EC-471A-744A-977A-9516277EC2C8}"/>
+                </a:ext>
+              </a:extLst>
+            </p:cNvPr>
+            <p:cNvSpPr txBox="1"/>
+            <p:nvPr/>
+          </p:nvSpPr>
+          <p:spPr>
+            <a:xfrm>
+              <a:off x="5004189" y="1848829"/>
+              <a:ext cx="914400" cy="685800"/>
+            </a:xfrm>
+            <a:prstGeom prst="rect">
+              <a:avLst/>
+            </a:prstGeom>
+            <a:noFill/>
+            <a:ln>
+              <a:solidFill>
+                <a:schemeClr val="tx1"/>
+              </a:solidFill>
+            </a:ln>
+          </p:spPr>
+          <p:txBody>
+            <a:bodyPr wrap="none" lIns="0" tIns="0" rIns="0" bIns="0" rtlCol="0" anchor="ctr" anchorCtr="1">
+              <a:noAutofit/>
+            </a:bodyPr>
+            <a:lstStyle/>
+            <a:p>
+              <a:pPr algn="ctr"/>
+              <a:r>
+                <a:rPr lang="en-US" dirty="0" err="1"/>
+                <a:t>uwsgi</a:t>
+              </a:r>
+              <a:endParaRPr lang="en-US" dirty="0"/>
+            </a:p>
+          </p:txBody>
+        </p:sp>
+        <p:sp>
+          <p:nvSpPr>
+            <p:cNvPr id="49" name="TextBox 48">
+              <a:extLst>
+                <a:ext uri="{FF2B5EF4-FFF2-40B4-BE49-F238E27FC236}">
+                  <a16:creationId xmlns:a16="http://schemas.microsoft.com/office/drawing/2014/main" id="{4AB0B62B-5304-2E4F-A7B6-EB3E84BFAD37}"/>
+                </a:ext>
+              </a:extLst>
+            </p:cNvPr>
+            <p:cNvSpPr txBox="1"/>
+            <p:nvPr/>
+          </p:nvSpPr>
+          <p:spPr>
+            <a:xfrm>
+              <a:off x="5004189" y="2537257"/>
+              <a:ext cx="914400" cy="685800"/>
+            </a:xfrm>
+            <a:prstGeom prst="rect">
+              <a:avLst/>
+            </a:prstGeom>
+            <a:noFill/>
+            <a:ln>
+              <a:solidFill>
+                <a:schemeClr val="tx1"/>
+              </a:solidFill>
+            </a:ln>
+          </p:spPr>
+          <p:txBody>
+            <a:bodyPr wrap="none" lIns="0" tIns="0" rIns="0" bIns="0" rtlCol="0" anchor="ctr" anchorCtr="1">
+              <a:noAutofit/>
+            </a:bodyPr>
+            <a:lstStyle/>
+            <a:p>
+              <a:pPr algn="ctr"/>
+              <a:r>
+                <a:rPr lang="en-US" dirty="0"/>
+                <a:t>Flask</a:t>
+              </a:r>
+            </a:p>
+          </p:txBody>
+        </p:sp>
+        <p:sp>
+          <p:nvSpPr>
+            <p:cNvPr id="63" name="TextBox 62">
+              <a:extLst>
+                <a:ext uri="{FF2B5EF4-FFF2-40B4-BE49-F238E27FC236}">
+                  <a16:creationId xmlns:a16="http://schemas.microsoft.com/office/drawing/2014/main" id="{A8DAA412-00DA-264B-B2E8-CF718FEB5395}"/>
+                </a:ext>
+              </a:extLst>
+            </p:cNvPr>
+            <p:cNvSpPr txBox="1"/>
+            <p:nvPr/>
+          </p:nvSpPr>
+          <p:spPr>
+            <a:xfrm>
+              <a:off x="3042745" y="4661448"/>
+              <a:ext cx="914400" cy="685800"/>
+            </a:xfrm>
+            <a:prstGeom prst="rect">
+              <a:avLst/>
+            </a:prstGeom>
+            <a:noFill/>
+            <a:ln>
+              <a:solidFill>
+                <a:schemeClr val="tx1"/>
+              </a:solidFill>
+            </a:ln>
+          </p:spPr>
+          <p:txBody>
+            <a:bodyPr wrap="none" lIns="0" tIns="0" rIns="0" bIns="0" rtlCol="0" anchor="ctr" anchorCtr="1">
+              <a:noAutofit/>
+            </a:bodyPr>
+            <a:lstStyle/>
+            <a:p>
+              <a:pPr algn="ctr"/>
+              <a:r>
+                <a:rPr lang="en-US" dirty="0"/>
+                <a:t>AD</a:t>
+              </a:r>
+            </a:p>
+            <a:p>
+              <a:pPr algn="ctr"/>
+              <a:r>
+                <a:rPr lang="en-US" dirty="0"/>
+                <a:t>LDAP</a:t>
+              </a:r>
+            </a:p>
+          </p:txBody>
+        </p:sp>
+        <p:sp>
+          <p:nvSpPr>
+            <p:cNvPr id="64" name="TextBox 63">
+              <a:extLst>
+                <a:ext uri="{FF2B5EF4-FFF2-40B4-BE49-F238E27FC236}">
+                  <a16:creationId xmlns:a16="http://schemas.microsoft.com/office/drawing/2014/main" id="{A17F5865-E064-0740-8903-8DDBF003B567}"/>
+                </a:ext>
+              </a:extLst>
+            </p:cNvPr>
+            <p:cNvSpPr txBox="1"/>
+            <p:nvPr/>
+          </p:nvSpPr>
+          <p:spPr>
+            <a:xfrm>
+              <a:off x="3042745" y="5734002"/>
+              <a:ext cx="4704646" cy="685800"/>
+            </a:xfrm>
+            <a:prstGeom prst="rect">
+              <a:avLst/>
+            </a:prstGeom>
+            <a:noFill/>
+            <a:ln>
+              <a:solidFill>
+                <a:schemeClr val="tx1"/>
+              </a:solidFill>
+            </a:ln>
+          </p:spPr>
+          <p:txBody>
+            <a:bodyPr wrap="none" lIns="0" tIns="0" rIns="0" bIns="0" rtlCol="0" anchor="ctr" anchorCtr="1">
+              <a:noAutofit/>
+            </a:bodyPr>
+            <a:lstStyle/>
+            <a:p>
+              <a:pPr algn="ctr"/>
+              <a:r>
+                <a:rPr lang="en-US" dirty="0"/>
+                <a:t>Filesystem</a:t>
+              </a:r>
+            </a:p>
+          </p:txBody>
+        </p:sp>
+        <p:cxnSp>
+          <p:nvCxnSpPr>
+            <p:cNvPr id="65" name="Straight Arrow Connector 64">
+              <a:extLst>
+                <a:ext uri="{FF2B5EF4-FFF2-40B4-BE49-F238E27FC236}">
+                  <a16:creationId xmlns:a16="http://schemas.microsoft.com/office/drawing/2014/main" id="{A8C4E340-CFD4-F94E-839A-B30AD7ADE505}"/>
+                </a:ext>
+              </a:extLst>
+            </p:cNvPr>
+            <p:cNvCxnSpPr>
+              <a:cxnSpLocks/>
+              <a:stCxn id="42" idx="0"/>
+              <a:endCxn id="35" idx="2"/>
+            </p:cNvCxnSpPr>
+            <p:nvPr/>
+          </p:nvCxnSpPr>
+          <p:spPr>
+            <a:xfrm flipV="1">
+              <a:off x="5461389" y="852968"/>
+              <a:ext cx="0" cy="307428"/>
+            </a:xfrm>
+            <a:prstGeom prst="straightConnector1">
+              <a:avLst/>
+            </a:prstGeom>
+            <a:ln w="12700">
+              <a:headEnd type="triangle"/>
+              <a:tailEnd type="triangle"/>
+            </a:ln>
+          </p:spPr>
+          <p:style>
+            <a:lnRef idx="1">
+              <a:schemeClr val="accent1"/>
+            </a:lnRef>
+            <a:fillRef idx="0">
+              <a:schemeClr val="accent1"/>
+            </a:fillRef>
+            <a:effectRef idx="0">
+              <a:schemeClr val="accent1"/>
+            </a:effectRef>
+            <a:fontRef idx="minor">
+              <a:schemeClr val="tx1"/>
+            </a:fontRef>
+          </p:style>
+        </p:cxnSp>
+        <p:sp>
+          <p:nvSpPr>
+            <p:cNvPr id="60" name="TextBox 59">
+              <a:extLst>
+                <a:ext uri="{FF2B5EF4-FFF2-40B4-BE49-F238E27FC236}">
+                  <a16:creationId xmlns:a16="http://schemas.microsoft.com/office/drawing/2014/main" id="{E68A6649-1BF7-624B-9D5D-3901D232A674}"/>
+                </a:ext>
+              </a:extLst>
+            </p:cNvPr>
+            <p:cNvSpPr txBox="1"/>
+            <p:nvPr/>
+          </p:nvSpPr>
+          <p:spPr>
+            <a:xfrm>
+              <a:off x="5036988" y="4639319"/>
+              <a:ext cx="3167896" cy="685800"/>
+            </a:xfrm>
+            <a:prstGeom prst="rect">
+              <a:avLst/>
+            </a:prstGeom>
+            <a:noFill/>
+            <a:ln>
+              <a:solidFill>
+                <a:schemeClr val="tx1"/>
+              </a:solidFill>
+            </a:ln>
+          </p:spPr>
+          <p:txBody>
+            <a:bodyPr wrap="none" lIns="0" tIns="0" rIns="0" bIns="0" rtlCol="0" anchor="ctr" anchorCtr="1">
+              <a:noAutofit/>
+            </a:bodyPr>
+            <a:lstStyle/>
+            <a:p>
+              <a:pPr algn="ctr"/>
+              <a:r>
+                <a:rPr lang="en-US" dirty="0"/>
+                <a:t>MySQL or SQLite or SQL Server</a:t>
+              </a:r>
+            </a:p>
+          </p:txBody>
+        </p:sp>
+        <p:sp>
+          <p:nvSpPr>
+            <p:cNvPr id="66" name="TextBox 65">
+              <a:extLst>
+                <a:ext uri="{FF2B5EF4-FFF2-40B4-BE49-F238E27FC236}">
+                  <a16:creationId xmlns:a16="http://schemas.microsoft.com/office/drawing/2014/main" id="{83994E02-5305-B64F-9710-EB3B684F8406}"/>
+                </a:ext>
+              </a:extLst>
+            </p:cNvPr>
+            <p:cNvSpPr txBox="1"/>
+            <p:nvPr/>
+          </p:nvSpPr>
+          <p:spPr>
+            <a:xfrm>
+              <a:off x="5015968" y="3221638"/>
+              <a:ext cx="902621" cy="685800"/>
+            </a:xfrm>
+            <a:prstGeom prst="rect">
+              <a:avLst/>
+            </a:prstGeom>
+            <a:noFill/>
+            <a:ln>
+              <a:solidFill>
+                <a:schemeClr val="tx1"/>
+              </a:solidFill>
+            </a:ln>
+          </p:spPr>
+          <p:txBody>
+            <a:bodyPr wrap="none" lIns="0" tIns="0" rIns="0" bIns="0" rtlCol="0" anchor="ctr" anchorCtr="1">
+              <a:noAutofit/>
+            </a:bodyPr>
+            <a:lstStyle/>
+            <a:p>
+              <a:pPr algn="ctr"/>
+              <a:r>
+                <a:rPr lang="en-US" dirty="0"/>
+                <a:t>SQL </a:t>
+              </a:r>
+            </a:p>
+            <a:p>
+              <a:pPr algn="ctr"/>
+              <a:r>
+                <a:rPr lang="en-US" dirty="0"/>
+                <a:t>Alchemy</a:t>
+              </a:r>
+            </a:p>
+          </p:txBody>
+        </p:sp>
+        <p:cxnSp>
+          <p:nvCxnSpPr>
+            <p:cNvPr id="67" name="Straight Arrow Connector 66">
+              <a:extLst>
+                <a:ext uri="{FF2B5EF4-FFF2-40B4-BE49-F238E27FC236}">
+                  <a16:creationId xmlns:a16="http://schemas.microsoft.com/office/drawing/2014/main" id="{CBA4241B-E1E4-7447-BB61-4EC82851BBFB}"/>
+                </a:ext>
+              </a:extLst>
+            </p:cNvPr>
+            <p:cNvCxnSpPr>
+              <a:cxnSpLocks/>
+              <a:stCxn id="63" idx="0"/>
+              <a:endCxn id="49" idx="1"/>
+            </p:cNvCxnSpPr>
+            <p:nvPr/>
+          </p:nvCxnSpPr>
+          <p:spPr>
+            <a:xfrm flipV="1">
+              <a:off x="3499945" y="2880157"/>
+              <a:ext cx="1504244" cy="1781291"/>
+            </a:xfrm>
+            <a:prstGeom prst="straightConnector1">
+              <a:avLst/>
+            </a:prstGeom>
+            <a:ln w="12700">
+              <a:headEnd type="triangle"/>
+              <a:tailEnd type="triangle"/>
+            </a:ln>
+          </p:spPr>
+          <p:style>
+            <a:lnRef idx="1">
+              <a:schemeClr val="accent1"/>
+            </a:lnRef>
+            <a:fillRef idx="0">
+              <a:schemeClr val="accent1"/>
+            </a:fillRef>
+            <a:effectRef idx="0">
+              <a:schemeClr val="accent1"/>
+            </a:effectRef>
+            <a:fontRef idx="minor">
+              <a:schemeClr val="tx1"/>
+            </a:fontRef>
+          </p:style>
+        </p:cxnSp>
+        <p:cxnSp>
+          <p:nvCxnSpPr>
+            <p:cNvPr id="68" name="Straight Arrow Connector 67">
+              <a:extLst>
+                <a:ext uri="{FF2B5EF4-FFF2-40B4-BE49-F238E27FC236}">
+                  <a16:creationId xmlns:a16="http://schemas.microsoft.com/office/drawing/2014/main" id="{C9B4CD69-9A89-764D-BBD3-429000C4BA69}"/>
+                </a:ext>
+              </a:extLst>
+            </p:cNvPr>
+            <p:cNvCxnSpPr>
+              <a:cxnSpLocks/>
+            </p:cNvCxnSpPr>
+            <p:nvPr/>
+          </p:nvCxnSpPr>
+          <p:spPr>
+            <a:xfrm flipV="1">
+              <a:off x="5494187" y="3921470"/>
+              <a:ext cx="0" cy="717849"/>
+            </a:xfrm>
+            <a:prstGeom prst="straightConnector1">
+              <a:avLst/>
+            </a:prstGeom>
+            <a:ln w="12700">
+              <a:headEnd type="triangle"/>
+              <a:tailEnd type="triangle"/>
+            </a:ln>
+          </p:spPr>
+          <p:style>
+            <a:lnRef idx="1">
+              <a:schemeClr val="accent1"/>
+            </a:lnRef>
+            <a:fillRef idx="0">
+              <a:schemeClr val="accent1"/>
+            </a:fillRef>
+            <a:effectRef idx="0">
+              <a:schemeClr val="accent1"/>
+            </a:effectRef>
+            <a:fontRef idx="minor">
+              <a:schemeClr val="tx1"/>
+            </a:fontRef>
+          </p:style>
+        </p:cxnSp>
+        <p:cxnSp>
+          <p:nvCxnSpPr>
+            <p:cNvPr id="70" name="Straight Arrow Connector 69">
+              <a:extLst>
+                <a:ext uri="{FF2B5EF4-FFF2-40B4-BE49-F238E27FC236}">
+                  <a16:creationId xmlns:a16="http://schemas.microsoft.com/office/drawing/2014/main" id="{23B1FF18-30E2-BB47-BB7C-D75A531F2AE3}"/>
+                </a:ext>
+              </a:extLst>
+            </p:cNvPr>
+            <p:cNvCxnSpPr>
+              <a:cxnSpLocks/>
+              <a:endCxn id="60" idx="2"/>
+            </p:cNvCxnSpPr>
+            <p:nvPr/>
+          </p:nvCxnSpPr>
+          <p:spPr>
+            <a:xfrm flipV="1">
+              <a:off x="6620936" y="5325119"/>
+              <a:ext cx="0" cy="408883"/>
+            </a:xfrm>
+            <a:prstGeom prst="straightConnector1">
+              <a:avLst/>
+            </a:prstGeom>
+            <a:ln w="12700">
+              <a:headEnd type="triangle"/>
+              <a:tailEnd type="triangle"/>
+            </a:ln>
+          </p:spPr>
+          <p:style>
+            <a:lnRef idx="1">
+              <a:schemeClr val="accent1"/>
+            </a:lnRef>
+            <a:fillRef idx="0">
+              <a:schemeClr val="accent1"/>
+            </a:fillRef>
+            <a:effectRef idx="0">
+              <a:schemeClr val="accent1"/>
+            </a:effectRef>
+            <a:fontRef idx="minor">
+              <a:schemeClr val="tx1"/>
+            </a:fontRef>
+          </p:style>
+        </p:cxnSp>
+        <p:cxnSp>
+          <p:nvCxnSpPr>
+            <p:cNvPr id="84" name="Straight Arrow Connector 83">
+              <a:extLst>
+                <a:ext uri="{FF2B5EF4-FFF2-40B4-BE49-F238E27FC236}">
+                  <a16:creationId xmlns:a16="http://schemas.microsoft.com/office/drawing/2014/main" id="{966AD837-9A5A-AB4D-8592-674E4603F335}"/>
+                </a:ext>
+              </a:extLst>
+            </p:cNvPr>
+            <p:cNvCxnSpPr>
+              <a:cxnSpLocks/>
+            </p:cNvCxnSpPr>
+            <p:nvPr/>
+          </p:nvCxnSpPr>
+          <p:spPr>
+            <a:xfrm flipV="1">
+              <a:off x="3499945" y="5325119"/>
+              <a:ext cx="0" cy="408883"/>
+            </a:xfrm>
+            <a:prstGeom prst="straightConnector1">
+              <a:avLst/>
+            </a:prstGeom>
+            <a:ln w="12700">
+              <a:headEnd type="triangle"/>
+              <a:tailEnd type="triangle"/>
+            </a:ln>
+          </p:spPr>
+          <p:style>
+            <a:lnRef idx="1">
+              <a:schemeClr val="accent1"/>
+            </a:lnRef>
+            <a:fillRef idx="0">
+              <a:schemeClr val="accent1"/>
+            </a:fillRef>
+            <a:effectRef idx="0">
+              <a:schemeClr val="accent1"/>
+            </a:effectRef>
+            <a:fontRef idx="minor">
+              <a:schemeClr val="tx1"/>
+            </a:fontRef>
+          </p:style>
+        </p:cxnSp>
+      </p:grpSp>
+    </p:spTree>
+    <p:extLst>
+      <p:ext uri="{BB962C8B-B14F-4D97-AF65-F5344CB8AC3E}">
+        <p14:creationId xmlns:p14="http://schemas.microsoft.com/office/powerpoint/2010/main" val="2216489642"/>
+      </p:ext>
+    </p:extLst>
+  </p:cSld>
+  <p:clrMapOvr>
+    <a:masterClrMapping/>
+  </p:clrMapOvr>
+</p:sld>
+</file>
+
+<file path=ppt/slides/slide2.xml><?xml version="1.0" encoding="utf-8"?>
+<p:sld xmlns:a="http://schemas.openxmlformats.org/drawingml/2006/main" xmlns:r="http://schemas.openxmlformats.org/officeDocument/2006/relationships" xmlns:p="http://schemas.openxmlformats.org/presentationml/2006/main">
+  <p:cSld>
+    <p:spTree>
+      <p:nvGrpSpPr>
+        <p:cNvPr id="1" name=""/>
+        <p:cNvGrpSpPr/>
+        <p:nvPr/>
+      </p:nvGrpSpPr>
+      <p:grpSpPr>
+        <a:xfrm>
+          <a:off x="0" y="0"/>
+          <a:ext cx="0" cy="0"/>
+          <a:chOff x="0" y="0"/>
+          <a:chExt cx="0" cy="0"/>
+        </a:xfrm>
+      </p:grpSpPr>
+      <p:grpSp>
+        <p:nvGrpSpPr>
+          <p:cNvPr id="19" name="Group 18">
+            <a:extLst>
+              <a:ext uri="{FF2B5EF4-FFF2-40B4-BE49-F238E27FC236}">
+                <a16:creationId xmlns:a16="http://schemas.microsoft.com/office/drawing/2014/main" id="{D606C4A4-EB85-584D-8C67-2818769C0828}"/>
+              </a:ext>
+            </a:extLst>
+          </p:cNvPr>
+          <p:cNvGrpSpPr/>
+          <p:nvPr/>
+        </p:nvGrpSpPr>
+        <p:grpSpPr>
+          <a:xfrm>
+            <a:off x="1864286" y="619488"/>
+            <a:ext cx="8552460" cy="5224760"/>
+            <a:chOff x="1864286" y="619488"/>
+            <a:chExt cx="8552460" cy="5224760"/>
+          </a:xfrm>
+        </p:grpSpPr>
+        <p:sp>
+          <p:nvSpPr>
+            <p:cNvPr id="41" name="Rectangle 40">
+              <a:extLst>
+                <a:ext uri="{FF2B5EF4-FFF2-40B4-BE49-F238E27FC236}">
+                  <a16:creationId xmlns:a16="http://schemas.microsoft.com/office/drawing/2014/main" id="{DC47EDBF-C4F8-BA48-A2A7-86D565F69F44}"/>
+                </a:ext>
+              </a:extLst>
+            </p:cNvPr>
+            <p:cNvSpPr/>
+            <p:nvPr/>
+          </p:nvSpPr>
+          <p:spPr>
+            <a:xfrm>
+              <a:off x="5770605" y="2197957"/>
+              <a:ext cx="4646141" cy="2034345"/>
+            </a:xfrm>
+            <a:prstGeom prst="rect">
+              <a:avLst/>
+            </a:prstGeom>
+            <a:solidFill>
+              <a:schemeClr val="bg2">
+                <a:alpha val="28622"/>
+              </a:schemeClr>
+            </a:solidFill>
+          </p:spPr>
+          <p:style>
+            <a:lnRef idx="2">
+              <a:schemeClr val="accent1">
+                <a:shade val="50000"/>
+              </a:schemeClr>
+            </a:lnRef>
+            <a:fillRef idx="1">
+              <a:schemeClr val="accent1"/>
+            </a:fillRef>
+            <a:effectRef idx="0">
+              <a:schemeClr val="accent1"/>
+            </a:effectRef>
+            <a:fontRef idx="minor">
+              <a:schemeClr val="lt1"/>
+            </a:fontRef>
+          </p:style>
+          <p:txBody>
+            <a:bodyPr rtlCol="0" anchor="ctr"/>
+            <a:lstStyle/>
+            <a:p>
+              <a:pPr algn="ctr"/>
+              <a:endParaRPr lang="en-US"/>
+            </a:p>
+          </p:txBody>
+        </p:sp>
         <p:sp>
           <p:nvSpPr>
             <p:cNvPr id="4" name="TextBox 3">
@@ -3360,7 +4072,7 @@
           </p:nvSpPr>
           <p:spPr>
             <a:xfrm>
-              <a:off x="4688596" y="3437578"/>
+              <a:off x="5911915" y="2461394"/>
               <a:ext cx="914400" cy="685800"/>
             </a:xfrm>
             <a:prstGeom prst="rect">
@@ -3401,7 +4113,7 @@
           </p:nvSpPr>
           <p:spPr>
             <a:xfrm>
-              <a:off x="4698102" y="5036791"/>
+              <a:off x="5921421" y="4715518"/>
               <a:ext cx="914400" cy="685800"/>
             </a:xfrm>
             <a:prstGeom prst="rect">
@@ -3442,7 +4154,7 @@
           </p:nvSpPr>
           <p:spPr>
             <a:xfrm>
-              <a:off x="6396036" y="3429000"/>
+              <a:off x="7619355" y="2452816"/>
               <a:ext cx="914400" cy="685800"/>
             </a:xfrm>
             <a:prstGeom prst="rect">
@@ -3484,7 +4196,7 @@
           </p:nvGrpSpPr>
           <p:grpSpPr>
             <a:xfrm>
-              <a:off x="3438479" y="1595672"/>
+              <a:off x="4661798" y="619488"/>
               <a:ext cx="3400192" cy="1315034"/>
               <a:chOff x="3500266" y="914400"/>
               <a:chExt cx="3400192" cy="1841156"/>
@@ -3707,7 +4419,7 @@
           </p:nvCxnSpPr>
           <p:spPr>
             <a:xfrm flipV="1">
-              <a:off x="5145796" y="2910706"/>
+              <a:off x="6369115" y="1934522"/>
               <a:ext cx="0" cy="526872"/>
             </a:xfrm>
             <a:prstGeom prst="straightConnector1">
@@ -3750,8 +4462,8 @@
           </p:nvCxnSpPr>
           <p:spPr>
             <a:xfrm flipV="1">
-              <a:off x="5155302" y="4123378"/>
-              <a:ext cx="6148" cy="913413"/>
+              <a:off x="6378621" y="4103121"/>
+              <a:ext cx="0" cy="612397"/>
             </a:xfrm>
             <a:prstGeom prst="straightConnector1">
               <a:avLst/>
@@ -3794,7 +4506,7 @@
           </p:nvCxnSpPr>
           <p:spPr>
             <a:xfrm flipV="1">
-              <a:off x="5602996" y="3771900"/>
+              <a:off x="6826315" y="2795716"/>
               <a:ext cx="793040" cy="8578"/>
             </a:xfrm>
             <a:prstGeom prst="straightConnector1">
@@ -3834,7 +4546,7 @@
           </p:nvGrpSpPr>
           <p:grpSpPr>
             <a:xfrm>
-              <a:off x="1069966" y="4700751"/>
+              <a:off x="2293285" y="4416549"/>
               <a:ext cx="2721332" cy="1356494"/>
               <a:chOff x="3500266" y="914400"/>
               <a:chExt cx="3400192" cy="1841156"/>
@@ -4014,9 +4726,9 @@
             <p:nvPr/>
           </p:nvCxnSpPr>
           <p:spPr>
-            <a:xfrm flipH="1" flipV="1">
-              <a:off x="3791298" y="5378998"/>
-              <a:ext cx="906804" cy="693"/>
+            <a:xfrm flipH="1">
+              <a:off x="5014617" y="5058418"/>
+              <a:ext cx="906804" cy="36378"/>
             </a:xfrm>
             <a:prstGeom prst="straightConnector1">
               <a:avLst/>
@@ -4055,7 +4767,7 @@
           </p:nvSpPr>
           <p:spPr>
             <a:xfrm>
-              <a:off x="3295756" y="3437578"/>
+              <a:off x="4519075" y="2461394"/>
               <a:ext cx="914400" cy="685800"/>
             </a:xfrm>
             <a:prstGeom prst="rect">
@@ -4107,7 +4819,7 @@
           </p:nvCxnSpPr>
           <p:spPr>
             <a:xfrm flipH="1">
-              <a:off x="4210156" y="3780478"/>
+              <a:off x="5433475" y="2804294"/>
               <a:ext cx="478440" cy="0"/>
             </a:xfrm>
             <a:prstGeom prst="straightConnector1">
@@ -4147,7 +4859,7 @@
           </p:nvSpPr>
           <p:spPr>
             <a:xfrm>
-              <a:off x="8104742" y="4938863"/>
+              <a:off x="9328061" y="4617590"/>
               <a:ext cx="914400" cy="685800"/>
             </a:xfrm>
             <a:prstGeom prst="rect">
@@ -4195,7 +4907,7 @@
           </p:nvSpPr>
           <p:spPr>
             <a:xfrm>
-              <a:off x="8104742" y="3420422"/>
+              <a:off x="9328061" y="2444238"/>
               <a:ext cx="914400" cy="685800"/>
             </a:xfrm>
             <a:prstGeom prst="rect">
@@ -4239,7 +4951,7 @@
           </p:nvCxnSpPr>
           <p:spPr>
             <a:xfrm flipV="1">
-              <a:off x="7312348" y="3763322"/>
+              <a:off x="8535667" y="2787138"/>
               <a:ext cx="793040" cy="8578"/>
             </a:xfrm>
             <a:prstGeom prst="straightConnector1">
@@ -4276,14 +4988,15 @@
             </p:cNvPr>
             <p:cNvCxnSpPr>
               <a:cxnSpLocks/>
+              <a:stCxn id="35" idx="0"/>
               <a:endCxn id="36" idx="2"/>
             </p:cNvCxnSpPr>
             <p:nvPr/>
           </p:nvCxnSpPr>
           <p:spPr>
             <a:xfrm flipV="1">
-              <a:off x="8560675" y="4106222"/>
-              <a:ext cx="1267" cy="814788"/>
+              <a:off x="9785261" y="3130038"/>
+              <a:ext cx="0" cy="1487552"/>
             </a:xfrm>
             <a:prstGeom prst="straightConnector1">
               <a:avLst/>
@@ -4310,57 +5023,6 @@
         </p:cxnSp>
         <p:sp>
           <p:nvSpPr>
-            <p:cNvPr id="41" name="Rectangle 40">
-              <a:extLst>
-                <a:ext uri="{FF2B5EF4-FFF2-40B4-BE49-F238E27FC236}">
-                  <a16:creationId xmlns:a16="http://schemas.microsoft.com/office/drawing/2014/main" id="{DC47EDBF-C4F8-BA48-A2A7-86D565F69F44}"/>
-                </a:ext>
-              </a:extLst>
-            </p:cNvPr>
-            <p:cNvSpPr/>
-            <p:nvPr/>
-          </p:nvSpPr>
-          <p:spPr>
-            <a:xfrm>
-              <a:off x="4547286" y="3174141"/>
-              <a:ext cx="4646141" cy="1477363"/>
-            </a:xfrm>
-            <a:prstGeom prst="rect">
-              <a:avLst/>
-            </a:prstGeom>
-            <a:solidFill>
-              <a:schemeClr val="bg2">
-                <a:alpha val="28622"/>
-              </a:schemeClr>
-            </a:solidFill>
-          </p:spPr>
-          <p:style>
-            <a:lnRef idx="2">
-              <a:schemeClr val="accent1">
-                <a:shade val="50000"/>
-              </a:schemeClr>
-            </a:lnRef>
-            <a:fillRef idx="1">
-              <a:schemeClr val="accent1"/>
-            </a:fillRef>
-            <a:effectRef idx="0">
-              <a:schemeClr val="accent1"/>
-            </a:effectRef>
-            <a:fontRef idx="minor">
-              <a:schemeClr val="lt1"/>
-            </a:fontRef>
-          </p:style>
-          <p:txBody>
-            <a:bodyPr rtlCol="0" anchor="ctr"/>
-            <a:lstStyle/>
-            <a:p>
-              <a:pPr algn="ctr"/>
-              <a:endParaRPr lang="en-US"/>
-            </a:p>
-          </p:txBody>
-        </p:sp>
-        <p:sp>
-          <p:nvSpPr>
             <p:cNvPr id="43" name="Rectangle 42">
               <a:extLst>
                 <a:ext uri="{FF2B5EF4-FFF2-40B4-BE49-F238E27FC236}">
@@ -4373,7 +5035,7 @@
           </p:nvSpPr>
           <p:spPr>
             <a:xfrm>
-              <a:off x="4205392" y="4809048"/>
+              <a:off x="5428711" y="4487775"/>
               <a:ext cx="1996867" cy="1356473"/>
             </a:xfrm>
             <a:prstGeom prst="rect">
@@ -4424,7 +5086,7 @@
           </p:nvSpPr>
           <p:spPr>
             <a:xfrm>
-              <a:off x="4322905" y="5764975"/>
+              <a:off x="5546224" y="5443702"/>
               <a:ext cx="1812163" cy="369332"/>
             </a:xfrm>
             <a:prstGeom prst="rect">
@@ -4459,7 +5121,7 @@
           </p:nvSpPr>
           <p:spPr>
             <a:xfrm>
-              <a:off x="5505607" y="4264456"/>
+              <a:off x="7247250" y="3615999"/>
               <a:ext cx="1812163" cy="369332"/>
             </a:xfrm>
             <a:prstGeom prst="rect">
@@ -4480,6 +5142,188 @@
             </a:p>
           </p:txBody>
         </p:sp>
+        <p:sp>
+          <p:nvSpPr>
+            <p:cNvPr id="70" name="TextBox 69">
+              <a:extLst>
+                <a:ext uri="{FF2B5EF4-FFF2-40B4-BE49-F238E27FC236}">
+                  <a16:creationId xmlns:a16="http://schemas.microsoft.com/office/drawing/2014/main" id="{43B3C95B-FD88-DA4D-B753-2DB77D8CAB09}"/>
+                </a:ext>
+              </a:extLst>
+            </p:cNvPr>
+            <p:cNvSpPr txBox="1"/>
+            <p:nvPr/>
+          </p:nvSpPr>
+          <p:spPr>
+            <a:xfrm>
+              <a:off x="1864286" y="2456595"/>
+              <a:ext cx="2156932" cy="685800"/>
+            </a:xfrm>
+            <a:prstGeom prst="rect">
+              <a:avLst/>
+            </a:prstGeom>
+            <a:noFill/>
+            <a:ln>
+              <a:solidFill>
+                <a:schemeClr val="tx1"/>
+              </a:solidFill>
+            </a:ln>
+          </p:spPr>
+          <p:txBody>
+            <a:bodyPr wrap="none" lIns="0" tIns="0" rIns="0" bIns="0" rtlCol="0" anchor="ctr" anchorCtr="1">
+              <a:noAutofit/>
+            </a:bodyPr>
+            <a:lstStyle/>
+            <a:p>
+              <a:pPr algn="ctr"/>
+              <a:r>
+                <a:rPr lang="en-US" sz="1600" dirty="0"/>
+                <a:t>Filesystem</a:t>
+              </a:r>
+            </a:p>
+            <a:p>
+              <a:pPr algn="ctr"/>
+              <a:r>
+                <a:rPr lang="en-US" sz="1600" dirty="0"/>
+                <a:t>Ad &amp; LDAP config files</a:t>
+              </a:r>
+            </a:p>
+          </p:txBody>
+        </p:sp>
+        <p:cxnSp>
+          <p:nvCxnSpPr>
+            <p:cNvPr id="71" name="Straight Arrow Connector 70">
+              <a:extLst>
+                <a:ext uri="{FF2B5EF4-FFF2-40B4-BE49-F238E27FC236}">
+                  <a16:creationId xmlns:a16="http://schemas.microsoft.com/office/drawing/2014/main" id="{64C894E6-D304-364D-A048-A8E772CB92B3}"/>
+                </a:ext>
+              </a:extLst>
+            </p:cNvPr>
+            <p:cNvCxnSpPr>
+              <a:cxnSpLocks/>
+            </p:cNvCxnSpPr>
+            <p:nvPr/>
+          </p:nvCxnSpPr>
+          <p:spPr>
+            <a:xfrm flipH="1">
+              <a:off x="4040635" y="2787138"/>
+              <a:ext cx="478440" cy="0"/>
+            </a:xfrm>
+            <a:prstGeom prst="straightConnector1">
+              <a:avLst/>
+            </a:prstGeom>
+            <a:ln w="12700">
+              <a:headEnd type="triangle"/>
+              <a:tailEnd type="triangle"/>
+            </a:ln>
+          </p:spPr>
+          <p:style>
+            <a:lnRef idx="1">
+              <a:schemeClr val="accent1"/>
+            </a:lnRef>
+            <a:fillRef idx="0">
+              <a:schemeClr val="accent1"/>
+            </a:fillRef>
+            <a:effectRef idx="0">
+              <a:schemeClr val="accent1"/>
+            </a:effectRef>
+            <a:fontRef idx="minor">
+              <a:schemeClr val="tx1"/>
+            </a:fontRef>
+          </p:style>
+        </p:cxnSp>
+        <p:sp>
+          <p:nvSpPr>
+            <p:cNvPr id="72" name="TextBox 71">
+              <a:extLst>
+                <a:ext uri="{FF2B5EF4-FFF2-40B4-BE49-F238E27FC236}">
+                  <a16:creationId xmlns:a16="http://schemas.microsoft.com/office/drawing/2014/main" id="{9BFDE8B0-F41E-A842-925D-E0137FCA38FB}"/>
+                </a:ext>
+              </a:extLst>
+            </p:cNvPr>
+            <p:cNvSpPr txBox="1"/>
+            <p:nvPr/>
+          </p:nvSpPr>
+          <p:spPr>
+            <a:xfrm>
+              <a:off x="5911915" y="3376489"/>
+              <a:ext cx="914400" cy="685800"/>
+            </a:xfrm>
+            <a:prstGeom prst="rect">
+              <a:avLst/>
+            </a:prstGeom>
+            <a:noFill/>
+            <a:ln>
+              <a:solidFill>
+                <a:schemeClr val="tx1"/>
+              </a:solidFill>
+            </a:ln>
+          </p:spPr>
+          <p:txBody>
+            <a:bodyPr wrap="none" lIns="0" tIns="0" rIns="0" bIns="0" rtlCol="0" anchor="ctr" anchorCtr="1">
+              <a:noAutofit/>
+            </a:bodyPr>
+            <a:lstStyle/>
+            <a:p>
+              <a:pPr algn="ctr"/>
+              <a:r>
+                <a:rPr lang="en-US" dirty="0"/>
+                <a:t>SQL</a:t>
+              </a:r>
+            </a:p>
+            <a:p>
+              <a:pPr algn="ctr"/>
+              <a:r>
+                <a:rPr lang="en-US" dirty="0"/>
+                <a:t>Alchemy</a:t>
+              </a:r>
+            </a:p>
+          </p:txBody>
+        </p:sp>
+        <p:cxnSp>
+          <p:nvCxnSpPr>
+            <p:cNvPr id="73" name="Straight Arrow Connector 72">
+              <a:extLst>
+                <a:ext uri="{FF2B5EF4-FFF2-40B4-BE49-F238E27FC236}">
+                  <a16:creationId xmlns:a16="http://schemas.microsoft.com/office/drawing/2014/main" id="{1A9E040B-2E83-F946-8047-F52F42DECEC0}"/>
+                </a:ext>
+              </a:extLst>
+            </p:cNvPr>
+            <p:cNvCxnSpPr>
+              <a:cxnSpLocks/>
+              <a:stCxn id="72" idx="0"/>
+              <a:endCxn id="4" idx="2"/>
+            </p:cNvCxnSpPr>
+            <p:nvPr/>
+          </p:nvCxnSpPr>
+          <p:spPr>
+            <a:xfrm flipV="1">
+              <a:off x="6369115" y="3147194"/>
+              <a:ext cx="0" cy="229295"/>
+            </a:xfrm>
+            <a:prstGeom prst="straightConnector1">
+              <a:avLst/>
+            </a:prstGeom>
+            <a:ln w="12700">
+              <a:headEnd type="triangle"/>
+              <a:tailEnd type="triangle"/>
+            </a:ln>
+          </p:spPr>
+          <p:style>
+            <a:lnRef idx="1">
+              <a:schemeClr val="accent1"/>
+            </a:lnRef>
+            <a:fillRef idx="0">
+              <a:schemeClr val="accent1"/>
+            </a:fillRef>
+            <a:effectRef idx="0">
+              <a:schemeClr val="accent1"/>
+            </a:effectRef>
+            <a:fontRef idx="minor">
+              <a:schemeClr val="tx1"/>
+            </a:fontRef>
+          </p:style>
+        </p:cxnSp>
       </p:grpSp>
     </p:spTree>
     <p:extLst>

</xml_diff>